<commit_message>
Update incorrect sequence diagram as per comments from v1.2 review
</commit_message>
<xml_diff>
--- a/docs/diagrams/AddmedsSequenceDiagram.pptx
+++ b/docs/diagrams/AddmedsSequenceDiagram.pptx
@@ -208,7 +208,7 @@
           <a:p>
             <a:fld id="{F5CC4B3F-88C1-4FFA-B1B6-F41C21DC6924}" type="datetimeFigureOut">
               <a:rPr lang="en-US" smtClean="0"/>
-              <a:t>16-Oct-18</a:t>
+              <a:t>24-Oct-18</a:t>
             </a:fld>
             <a:endParaRPr lang="en-US"/>
           </a:p>
@@ -738,7 +738,7 @@
           <a:p>
             <a:fld id="{78C97017-6FC3-485B-9764-EAC9E56C1D49}" type="datetimeFigureOut">
               <a:rPr lang="en-US" smtClean="0"/>
-              <a:t>16-Oct-18</a:t>
+              <a:t>24-Oct-18</a:t>
             </a:fld>
             <a:endParaRPr lang="en-US"/>
           </a:p>
@@ -906,7 +906,7 @@
           <a:p>
             <a:fld id="{78C97017-6FC3-485B-9764-EAC9E56C1D49}" type="datetimeFigureOut">
               <a:rPr lang="en-US" smtClean="0"/>
-              <a:t>16-Oct-18</a:t>
+              <a:t>24-Oct-18</a:t>
             </a:fld>
             <a:endParaRPr lang="en-US"/>
           </a:p>
@@ -1084,7 +1084,7 @@
           <a:p>
             <a:fld id="{78C97017-6FC3-485B-9764-EAC9E56C1D49}" type="datetimeFigureOut">
               <a:rPr lang="en-US" smtClean="0"/>
-              <a:t>16-Oct-18</a:t>
+              <a:t>24-Oct-18</a:t>
             </a:fld>
             <a:endParaRPr lang="en-US"/>
           </a:p>
@@ -1252,7 +1252,7 @@
           <a:p>
             <a:fld id="{78C97017-6FC3-485B-9764-EAC9E56C1D49}" type="datetimeFigureOut">
               <a:rPr lang="en-US" smtClean="0"/>
-              <a:t>16-Oct-18</a:t>
+              <a:t>24-Oct-18</a:t>
             </a:fld>
             <a:endParaRPr lang="en-US"/>
           </a:p>
@@ -1497,7 +1497,7 @@
           <a:p>
             <a:fld id="{78C97017-6FC3-485B-9764-EAC9E56C1D49}" type="datetimeFigureOut">
               <a:rPr lang="en-US" smtClean="0"/>
-              <a:t>16-Oct-18</a:t>
+              <a:t>24-Oct-18</a:t>
             </a:fld>
             <a:endParaRPr lang="en-US"/>
           </a:p>
@@ -1782,7 +1782,7 @@
           <a:p>
             <a:fld id="{78C97017-6FC3-485B-9764-EAC9E56C1D49}" type="datetimeFigureOut">
               <a:rPr lang="en-US" smtClean="0"/>
-              <a:t>16-Oct-18</a:t>
+              <a:t>24-Oct-18</a:t>
             </a:fld>
             <a:endParaRPr lang="en-US"/>
           </a:p>
@@ -2201,7 +2201,7 @@
           <a:p>
             <a:fld id="{78C97017-6FC3-485B-9764-EAC9E56C1D49}" type="datetimeFigureOut">
               <a:rPr lang="en-US" smtClean="0"/>
-              <a:t>16-Oct-18</a:t>
+              <a:t>24-Oct-18</a:t>
             </a:fld>
             <a:endParaRPr lang="en-US"/>
           </a:p>
@@ -2318,7 +2318,7 @@
           <a:p>
             <a:fld id="{78C97017-6FC3-485B-9764-EAC9E56C1D49}" type="datetimeFigureOut">
               <a:rPr lang="en-US" smtClean="0"/>
-              <a:t>16-Oct-18</a:t>
+              <a:t>24-Oct-18</a:t>
             </a:fld>
             <a:endParaRPr lang="en-US"/>
           </a:p>
@@ -2413,7 +2413,7 @@
           <a:p>
             <a:fld id="{78C97017-6FC3-485B-9764-EAC9E56C1D49}" type="datetimeFigureOut">
               <a:rPr lang="en-US" smtClean="0"/>
-              <a:t>16-Oct-18</a:t>
+              <a:t>24-Oct-18</a:t>
             </a:fld>
             <a:endParaRPr lang="en-US"/>
           </a:p>
@@ -2688,7 +2688,7 @@
           <a:p>
             <a:fld id="{78C97017-6FC3-485B-9764-EAC9E56C1D49}" type="datetimeFigureOut">
               <a:rPr lang="en-US" smtClean="0"/>
-              <a:t>16-Oct-18</a:t>
+              <a:t>24-Oct-18</a:t>
             </a:fld>
             <a:endParaRPr lang="en-US"/>
           </a:p>
@@ -2940,7 +2940,7 @@
           <a:p>
             <a:fld id="{78C97017-6FC3-485B-9764-EAC9E56C1D49}" type="datetimeFigureOut">
               <a:rPr lang="en-US" smtClean="0"/>
-              <a:t>16-Oct-18</a:t>
+              <a:t>24-Oct-18</a:t>
             </a:fld>
             <a:endParaRPr lang="en-US"/>
           </a:p>
@@ -3151,7 +3151,7 @@
           <a:p>
             <a:fld id="{78C97017-6FC3-485B-9764-EAC9E56C1D49}" type="datetimeFigureOut">
               <a:rPr lang="en-US" smtClean="0"/>
-              <a:t>16-Oct-18</a:t>
+              <a:t>24-Oct-18</a:t>
             </a:fld>
             <a:endParaRPr lang="en-US"/>
           </a:p>
@@ -4008,8 +4008,8 @@
         </p:nvSpPr>
         <p:spPr>
           <a:xfrm>
-            <a:off x="5456801" y="1595828"/>
-            <a:ext cx="162711" cy="1080759"/>
+            <a:off x="5456801" y="1595829"/>
+            <a:ext cx="162711" cy="126428"/>
           </a:xfrm>
           <a:prstGeom prst="rect">
             <a:avLst/>
@@ -4142,7 +4142,7 @@
         </p:nvCxnSpPr>
         <p:spPr>
           <a:xfrm>
-            <a:off x="4113158" y="1847956"/>
+            <a:off x="4082185" y="1914755"/>
             <a:ext cx="1370490" cy="1"/>
           </a:xfrm>
           <a:prstGeom prst="straightConnector1">
@@ -5195,7 +5195,7 @@
         </p:nvSpPr>
         <p:spPr>
           <a:xfrm>
-            <a:off x="4369555" y="1619356"/>
+            <a:off x="4338582" y="1686155"/>
             <a:ext cx="933080" cy="184666"/>
           </a:xfrm>
           <a:prstGeom prst="rect">
@@ -5288,7 +5288,7 @@
         </p:nvCxnSpPr>
         <p:spPr>
           <a:xfrm>
-            <a:off x="5637492" y="1991672"/>
+            <a:off x="5637492" y="1981200"/>
             <a:ext cx="958629" cy="0"/>
           </a:xfrm>
           <a:prstGeom prst="straightConnector1">
@@ -5327,13 +5327,14 @@
           </p:cNvPr>
           <p:cNvCxnSpPr>
             <a:cxnSpLocks/>
+            <a:stCxn id="21" idx="0"/>
           </p:cNvCxnSpPr>
           <p:nvPr/>
         </p:nvCxnSpPr>
         <p:spPr>
-          <a:xfrm>
-            <a:off x="5533902" y="2032200"/>
-            <a:ext cx="0" cy="926908"/>
+          <a:xfrm flipH="1">
+            <a:off x="5533903" y="1595829"/>
+            <a:ext cx="4254" cy="1363279"/>
           </a:xfrm>
           <a:prstGeom prst="line">
             <a:avLst/>
@@ -6408,6 +6409,59 @@
               </a:rPr>
               <a:t>X</a:t>
             </a:r>
+          </a:p>
+        </p:txBody>
+      </p:sp>
+      <p:sp>
+        <p:nvSpPr>
+          <p:cNvPr id="63" name="Rectangle 62">
+            <a:extLst>
+              <a:ext uri="{FF2B5EF4-FFF2-40B4-BE49-F238E27FC236}">
+                <a16:creationId xmlns:a16="http://schemas.microsoft.com/office/drawing/2014/main" id="{A7BF1B9D-FF3B-46DA-AB76-6ABB695A7B70}"/>
+              </a:ext>
+            </a:extLst>
+          </p:cNvPr>
+          <p:cNvSpPr/>
+          <p:nvPr/>
+        </p:nvSpPr>
+        <p:spPr>
+          <a:xfrm>
+            <a:off x="5457427" y="1922192"/>
+            <a:ext cx="162711" cy="752559"/>
+          </a:xfrm>
+          <a:prstGeom prst="rect">
+            <a:avLst/>
+          </a:prstGeom>
+          <a:solidFill>
+            <a:srgbClr val="0070C0"/>
+          </a:solidFill>
+          <a:ln>
+            <a:solidFill>
+              <a:srgbClr val="0070C0"/>
+            </a:solidFill>
+          </a:ln>
+          <a:effectLst/>
+        </p:spPr>
+        <p:style>
+          <a:lnRef idx="1">
+            <a:schemeClr val="accent3"/>
+          </a:lnRef>
+          <a:fillRef idx="2">
+            <a:schemeClr val="accent3"/>
+          </a:fillRef>
+          <a:effectRef idx="1">
+            <a:schemeClr val="accent3"/>
+          </a:effectRef>
+          <a:fontRef idx="minor">
+            <a:schemeClr val="dk1"/>
+          </a:fontRef>
+        </p:style>
+        <p:txBody>
+          <a:bodyPr rtlCol="0" anchor="ctr"/>
+          <a:lstStyle/>
+          <a:p>
+            <a:pPr algn="ctr"/>
+            <a:endParaRPr lang="en-SG" sz="1400"/>
           </a:p>
         </p:txBody>
       </p:sp>

</xml_diff>

<commit_message>
Fix addmeds diagram in Developer Guide
</commit_message>
<xml_diff>
--- a/docs/diagrams/AddmedsSequenceDiagram.pptx
+++ b/docs/diagrams/AddmedsSequenceDiagram.pptx
@@ -208,7 +208,7 @@
           <a:p>
             <a:fld id="{F5CC4B3F-88C1-4FFA-B1B6-F41C21DC6924}" type="datetimeFigureOut">
               <a:rPr lang="en-US" smtClean="0"/>
-              <a:t>24-Oct-18</a:t>
+              <a:t>12-Nov-18</a:t>
             </a:fld>
             <a:endParaRPr lang="en-US"/>
           </a:p>
@@ -738,7 +738,7 @@
           <a:p>
             <a:fld id="{78C97017-6FC3-485B-9764-EAC9E56C1D49}" type="datetimeFigureOut">
               <a:rPr lang="en-US" smtClean="0"/>
-              <a:t>24-Oct-18</a:t>
+              <a:t>12-Nov-18</a:t>
             </a:fld>
             <a:endParaRPr lang="en-US"/>
           </a:p>
@@ -906,7 +906,7 @@
           <a:p>
             <a:fld id="{78C97017-6FC3-485B-9764-EAC9E56C1D49}" type="datetimeFigureOut">
               <a:rPr lang="en-US" smtClean="0"/>
-              <a:t>24-Oct-18</a:t>
+              <a:t>12-Nov-18</a:t>
             </a:fld>
             <a:endParaRPr lang="en-US"/>
           </a:p>
@@ -1084,7 +1084,7 @@
           <a:p>
             <a:fld id="{78C97017-6FC3-485B-9764-EAC9E56C1D49}" type="datetimeFigureOut">
               <a:rPr lang="en-US" smtClean="0"/>
-              <a:t>24-Oct-18</a:t>
+              <a:t>12-Nov-18</a:t>
             </a:fld>
             <a:endParaRPr lang="en-US"/>
           </a:p>
@@ -1252,7 +1252,7 @@
           <a:p>
             <a:fld id="{78C97017-6FC3-485B-9764-EAC9E56C1D49}" type="datetimeFigureOut">
               <a:rPr lang="en-US" smtClean="0"/>
-              <a:t>24-Oct-18</a:t>
+              <a:t>12-Nov-18</a:t>
             </a:fld>
             <a:endParaRPr lang="en-US"/>
           </a:p>
@@ -1497,7 +1497,7 @@
           <a:p>
             <a:fld id="{78C97017-6FC3-485B-9764-EAC9E56C1D49}" type="datetimeFigureOut">
               <a:rPr lang="en-US" smtClean="0"/>
-              <a:t>24-Oct-18</a:t>
+              <a:t>12-Nov-18</a:t>
             </a:fld>
             <a:endParaRPr lang="en-US"/>
           </a:p>
@@ -1782,7 +1782,7 @@
           <a:p>
             <a:fld id="{78C97017-6FC3-485B-9764-EAC9E56C1D49}" type="datetimeFigureOut">
               <a:rPr lang="en-US" smtClean="0"/>
-              <a:t>24-Oct-18</a:t>
+              <a:t>12-Nov-18</a:t>
             </a:fld>
             <a:endParaRPr lang="en-US"/>
           </a:p>
@@ -2201,7 +2201,7 @@
           <a:p>
             <a:fld id="{78C97017-6FC3-485B-9764-EAC9E56C1D49}" type="datetimeFigureOut">
               <a:rPr lang="en-US" smtClean="0"/>
-              <a:t>24-Oct-18</a:t>
+              <a:t>12-Nov-18</a:t>
             </a:fld>
             <a:endParaRPr lang="en-US"/>
           </a:p>
@@ -2318,7 +2318,7 @@
           <a:p>
             <a:fld id="{78C97017-6FC3-485B-9764-EAC9E56C1D49}" type="datetimeFigureOut">
               <a:rPr lang="en-US" smtClean="0"/>
-              <a:t>24-Oct-18</a:t>
+              <a:t>12-Nov-18</a:t>
             </a:fld>
             <a:endParaRPr lang="en-US"/>
           </a:p>
@@ -2413,7 +2413,7 @@
           <a:p>
             <a:fld id="{78C97017-6FC3-485B-9764-EAC9E56C1D49}" type="datetimeFigureOut">
               <a:rPr lang="en-US" smtClean="0"/>
-              <a:t>24-Oct-18</a:t>
+              <a:t>12-Nov-18</a:t>
             </a:fld>
             <a:endParaRPr lang="en-US"/>
           </a:p>
@@ -2688,7 +2688,7 @@
           <a:p>
             <a:fld id="{78C97017-6FC3-485B-9764-EAC9E56C1D49}" type="datetimeFigureOut">
               <a:rPr lang="en-US" smtClean="0"/>
-              <a:t>24-Oct-18</a:t>
+              <a:t>12-Nov-18</a:t>
             </a:fld>
             <a:endParaRPr lang="en-US"/>
           </a:p>
@@ -2940,7 +2940,7 @@
           <a:p>
             <a:fld id="{78C97017-6FC3-485B-9764-EAC9E56C1D49}" type="datetimeFigureOut">
               <a:rPr lang="en-US" smtClean="0"/>
-              <a:t>24-Oct-18</a:t>
+              <a:t>12-Nov-18</a:t>
             </a:fld>
             <a:endParaRPr lang="en-US"/>
           </a:p>
@@ -3151,7 +3151,7 @@
           <a:p>
             <a:fld id="{78C97017-6FC3-485B-9764-EAC9E56C1D49}" type="datetimeFigureOut">
               <a:rPr lang="en-US" smtClean="0"/>
-              <a:t>24-Oct-18</a:t>
+              <a:t>12-Nov-18</a:t>
             </a:fld>
             <a:endParaRPr lang="en-US"/>
           </a:p>
@@ -3534,8 +3534,8 @@
         </p:nvSpPr>
         <p:spPr>
           <a:xfrm>
-            <a:off x="7916308" y="113321"/>
-            <a:ext cx="3818492" cy="5767083"/>
+            <a:off x="9361115" y="152400"/>
+            <a:ext cx="3451961" cy="5861781"/>
           </a:xfrm>
           <a:prstGeom prst="roundRect">
             <a:avLst>
@@ -3596,7 +3596,7 @@
         <p:spPr>
           <a:xfrm>
             <a:off x="47796" y="152400"/>
-            <a:ext cx="7782903" cy="5746986"/>
+            <a:ext cx="9226877" cy="5828022"/>
           </a:xfrm>
           <a:prstGeom prst="roundRect">
             <a:avLst>
@@ -4516,8 +4516,8 @@
         </p:nvSpPr>
         <p:spPr>
           <a:xfrm>
-            <a:off x="9422067" y="4252564"/>
-            <a:ext cx="2181777" cy="335427"/>
+            <a:off x="10868559" y="4365889"/>
+            <a:ext cx="1466097" cy="335427"/>
           </a:xfrm>
           <a:prstGeom prst="rect">
             <a:avLst/>
@@ -4565,7 +4565,7 @@
                   <a:schemeClr val="bg1"/>
                 </a:solidFill>
               </a:rPr>
-              <a:t>VersionedAddressBook</a:t>
+              <a:t>AddressBook</a:t>
             </a:r>
             <a:endParaRPr lang="en-SG" sz="1600" dirty="0">
               <a:solidFill>
@@ -4583,7 +4583,7 @@
         </p:nvSpPr>
         <p:spPr>
           <a:xfrm>
-            <a:off x="10454855" y="4994578"/>
+            <a:off x="11533132" y="5128355"/>
             <a:ext cx="130250" cy="263220"/>
           </a:xfrm>
           <a:prstGeom prst="rect">
@@ -4670,7 +4670,7 @@
         </p:nvSpPr>
         <p:spPr>
           <a:xfrm>
-            <a:off x="8341278" y="2837489"/>
+            <a:off x="9419555" y="2971266"/>
             <a:ext cx="841636" cy="300180"/>
           </a:xfrm>
           <a:prstGeom prst="rect">
@@ -4731,7 +4731,7 @@
         </p:nvCxnSpPr>
         <p:spPr>
           <a:xfrm flipH="1">
-            <a:off x="8726530" y="3120076"/>
+            <a:off x="9804807" y="3253853"/>
             <a:ext cx="8756" cy="2594920"/>
           </a:xfrm>
           <a:prstGeom prst="line">
@@ -4984,7 +4984,7 @@
         </p:nvCxnSpPr>
         <p:spPr>
           <a:xfrm>
-            <a:off x="10519825" y="4479081"/>
+            <a:off x="11598102" y="4612858"/>
             <a:ext cx="9149" cy="1075298"/>
           </a:xfrm>
           <a:prstGeom prst="line">
@@ -5010,47 +5010,6 @@
           </a:effectRef>
           <a:fontRef idx="minor">
             <a:schemeClr val="dk1"/>
-          </a:fontRef>
-        </p:style>
-      </p:cxnSp>
-      <p:cxnSp>
-        <p:nvCxnSpPr>
-          <p:cNvPr id="13" name="Curved Connector 12"/>
-          <p:cNvCxnSpPr>
-            <a:cxnSpLocks/>
-          </p:cNvCxnSpPr>
-          <p:nvPr/>
-        </p:nvCxnSpPr>
-        <p:spPr>
-          <a:xfrm rot="16200000" flipH="1">
-            <a:off x="7164104" y="3613385"/>
-            <a:ext cx="156923" cy="76200"/>
-          </a:xfrm>
-          <a:prstGeom prst="curvedConnector4">
-            <a:avLst>
-              <a:gd name="adj1" fmla="val -32706"/>
-              <a:gd name="adj2" fmla="val 338776"/>
-            </a:avLst>
-          </a:prstGeom>
-          <a:ln>
-            <a:solidFill>
-              <a:srgbClr val="7030A0"/>
-            </a:solidFill>
-            <a:tailEnd type="triangle"/>
-          </a:ln>
-        </p:spPr>
-        <p:style>
-          <a:lnRef idx="1">
-            <a:schemeClr val="accent1"/>
-          </a:lnRef>
-          <a:fillRef idx="0">
-            <a:schemeClr val="accent1"/>
-          </a:fillRef>
-          <a:effectRef idx="0">
-            <a:schemeClr val="accent1"/>
-          </a:effectRef>
-          <a:fontRef idx="minor">
-            <a:schemeClr val="tx1"/>
           </a:fontRef>
         </p:style>
       </p:cxnSp>
@@ -5064,7 +5023,7 @@
         </p:nvCxnSpPr>
         <p:spPr>
           <a:xfrm>
-            <a:off x="8818751" y="5029200"/>
+            <a:off x="9897028" y="5162977"/>
             <a:ext cx="1636104" cy="0"/>
           </a:xfrm>
           <a:prstGeom prst="straightConnector1">
@@ -5509,109 +5468,6 @@
       </p:sp>
       <p:sp>
         <p:nvSpPr>
-          <p:cNvPr id="78" name="Rectangle 77">
-            <a:extLst>
-              <a:ext uri="{FF2B5EF4-FFF2-40B4-BE49-F238E27FC236}">
-                <a16:creationId xmlns:a16="http://schemas.microsoft.com/office/drawing/2014/main" id="{363E1D8D-F4DB-4C9A-91AD-FBCD72DF1279}"/>
-              </a:ext>
-            </a:extLst>
-          </p:cNvPr>
-          <p:cNvSpPr/>
-          <p:nvPr/>
-        </p:nvSpPr>
-        <p:spPr>
-          <a:xfrm>
-            <a:off x="7150203" y="3681962"/>
-            <a:ext cx="183653" cy="184665"/>
-          </a:xfrm>
-          <a:prstGeom prst="rect">
-            <a:avLst/>
-          </a:prstGeom>
-          <a:solidFill>
-            <a:srgbClr val="0070C0"/>
-          </a:solidFill>
-          <a:ln>
-            <a:solidFill>
-              <a:srgbClr val="0070C0"/>
-            </a:solidFill>
-          </a:ln>
-          <a:effectLst/>
-        </p:spPr>
-        <p:style>
-          <a:lnRef idx="1">
-            <a:schemeClr val="accent3"/>
-          </a:lnRef>
-          <a:fillRef idx="2">
-            <a:schemeClr val="accent3"/>
-          </a:fillRef>
-          <a:effectRef idx="1">
-            <a:schemeClr val="accent3"/>
-          </a:effectRef>
-          <a:fontRef idx="minor">
-            <a:schemeClr val="dk1"/>
-          </a:fontRef>
-        </p:style>
-        <p:txBody>
-          <a:bodyPr rtlCol="0" anchor="ctr"/>
-          <a:lstStyle/>
-          <a:p>
-            <a:pPr algn="ctr"/>
-            <a:endParaRPr lang="en-SG" sz="1400"/>
-          </a:p>
-        </p:txBody>
-      </p:sp>
-      <p:cxnSp>
-        <p:nvCxnSpPr>
-          <p:cNvPr id="98" name="Connector: Curved 97">
-            <a:extLst>
-              <a:ext uri="{FF2B5EF4-FFF2-40B4-BE49-F238E27FC236}">
-                <a16:creationId xmlns:a16="http://schemas.microsoft.com/office/drawing/2014/main" id="{03D66233-E61F-4981-9344-1CA16E716E4C}"/>
-              </a:ext>
-            </a:extLst>
-          </p:cNvPr>
-          <p:cNvCxnSpPr>
-            <a:cxnSpLocks/>
-          </p:cNvCxnSpPr>
-          <p:nvPr/>
-        </p:nvCxnSpPr>
-        <p:spPr>
-          <a:xfrm flipH="1">
-            <a:off x="7239000" y="3838613"/>
-            <a:ext cx="131954" cy="199987"/>
-          </a:xfrm>
-          <a:prstGeom prst="curvedConnector4">
-            <a:avLst>
-              <a:gd name="adj1" fmla="val -53034"/>
-              <a:gd name="adj2" fmla="val 101078"/>
-            </a:avLst>
-          </a:prstGeom>
-          <a:ln w="9525" cap="flat" cmpd="sng" algn="ctr">
-            <a:solidFill>
-              <a:schemeClr val="accent1"/>
-            </a:solidFill>
-            <a:prstDash val="dash"/>
-            <a:round/>
-            <a:headEnd type="none" w="med" len="med"/>
-            <a:tailEnd type="none" w="med" len="med"/>
-          </a:ln>
-        </p:spPr>
-        <p:style>
-          <a:lnRef idx="0">
-            <a:scrgbClr r="0" g="0" b="0"/>
-          </a:lnRef>
-          <a:fillRef idx="0">
-            <a:scrgbClr r="0" g="0" b="0"/>
-          </a:fillRef>
-          <a:effectRef idx="0">
-            <a:scrgbClr r="0" g="0" b="0"/>
-          </a:effectRef>
-          <a:fontRef idx="minor">
-            <a:schemeClr val="tx1"/>
-          </a:fontRef>
-        </p:style>
-      </p:cxnSp>
-      <p:sp>
-        <p:nvSpPr>
           <p:cNvPr id="109" name="TextBox 108">
             <a:extLst>
               <a:ext uri="{FF2B5EF4-FFF2-40B4-BE49-F238E27FC236}">
@@ -5624,7 +5480,7 @@
         </p:nvSpPr>
         <p:spPr>
           <a:xfrm>
-            <a:off x="7331826" y="3886200"/>
+            <a:off x="7284221" y="3515929"/>
             <a:ext cx="1126374" cy="153888"/>
           </a:xfrm>
           <a:prstGeom prst="rect">
@@ -5651,13 +5507,7 @@
           <a:p>
             <a:pPr algn="ctr"/>
             <a:r>
-              <a:rPr lang="en-US" sz="1000" dirty="0" err="1">
-                <a:solidFill>
-                  <a:schemeClr val="accent4">
-                    <a:lumMod val="75000"/>
-                  </a:schemeClr>
-                </a:solidFill>
-              </a:rPr>
+              <a:rPr lang="en-US" sz="1000" dirty="0" err="1"/>
               <a:t>patientToUpdate</a:t>
             </a:r>
             <a:endParaRPr lang="en-US" sz="1000" dirty="0"/>
@@ -5678,7 +5528,7 @@
         </p:nvSpPr>
         <p:spPr>
           <a:xfrm>
-            <a:off x="8631776" y="4922469"/>
+            <a:off x="9710053" y="5056246"/>
             <a:ext cx="183730" cy="414435"/>
           </a:xfrm>
           <a:prstGeom prst="rect">
@@ -5733,8 +5583,8 @@
         </p:nvCxnSpPr>
         <p:spPr>
           <a:xfrm flipV="1">
-            <a:off x="7223406" y="4933268"/>
-            <a:ext cx="1447218" cy="4890"/>
+            <a:off x="7207554" y="5058107"/>
+            <a:ext cx="2501125" cy="17907"/>
           </a:xfrm>
           <a:prstGeom prst="straightConnector1">
             <a:avLst/>
@@ -5775,7 +5625,7 @@
         </p:nvSpPr>
         <p:spPr>
           <a:xfrm>
-            <a:off x="7169472" y="4718125"/>
+            <a:off x="8334333" y="4785927"/>
             <a:ext cx="1474852" cy="184666"/>
           </a:xfrm>
           <a:prstGeom prst="rect">
@@ -5839,7 +5689,7 @@
         </p:nvSpPr>
         <p:spPr>
           <a:xfrm>
-            <a:off x="8880168" y="4794339"/>
+            <a:off x="9958445" y="4928116"/>
             <a:ext cx="1474852" cy="184666"/>
           </a:xfrm>
           <a:prstGeom prst="rect">
@@ -5905,7 +5755,7 @@
         </p:nvCxnSpPr>
         <p:spPr>
           <a:xfrm>
-            <a:off x="8786792" y="5247368"/>
+            <a:off x="9865069" y="5381145"/>
             <a:ext cx="1668063" cy="10430"/>
           </a:xfrm>
           <a:prstGeom prst="straightConnector1">
@@ -5952,8 +5802,8 @@
         </p:nvCxnSpPr>
         <p:spPr>
           <a:xfrm>
-            <a:off x="7209406" y="5326474"/>
-            <a:ext cx="1514235" cy="10430"/>
+            <a:off x="7221847" y="5470681"/>
+            <a:ext cx="2580071" cy="0"/>
           </a:xfrm>
           <a:prstGeom prst="straightConnector1">
             <a:avLst/>
@@ -5996,7 +5846,7 @@
         </p:nvSpPr>
         <p:spPr>
           <a:xfrm>
-            <a:off x="7195215" y="3283897"/>
+            <a:off x="7116494" y="3035273"/>
             <a:ext cx="1365410" cy="307777"/>
           </a:xfrm>
           <a:prstGeom prst="rect">
@@ -6023,46 +5873,21 @@
           <a:p>
             <a:pPr algn="ctr"/>
             <a:r>
-              <a:rPr lang="en-US" sz="1000" dirty="0" err="1">
-                <a:solidFill>
-                  <a:schemeClr val="accent4">
-                    <a:lumMod val="75000"/>
-                  </a:schemeClr>
-                </a:solidFill>
-              </a:rPr>
+              <a:rPr lang="en-US" sz="1000" dirty="0" err="1"/>
               <a:t>getPatient</a:t>
             </a:r>
             <a:r>
-              <a:rPr lang="en-US" sz="1000" dirty="0">
-                <a:solidFill>
-                  <a:schemeClr val="accent4">
-                    <a:lumMod val="75000"/>
-                  </a:schemeClr>
-                </a:solidFill>
-              </a:rPr>
+              <a:rPr lang="en-US" sz="1000" dirty="0"/>
               <a:t>(</a:t>
             </a:r>
             <a:r>
-              <a:rPr lang="en-US" sz="1000" dirty="0" err="1">
-                <a:solidFill>
-                  <a:schemeClr val="accent4">
-                    <a:lumMod val="75000"/>
-                  </a:schemeClr>
-                </a:solidFill>
-              </a:rPr>
+              <a:rPr lang="en-US" sz="1000" dirty="0" err="1"/>
               <a:t>patientNric</a:t>
             </a:r>
             <a:r>
-              <a:rPr lang="en-US" sz="1000" dirty="0">
-                <a:solidFill>
-                  <a:schemeClr val="accent4">
-                    <a:lumMod val="75000"/>
-                  </a:schemeClr>
-                </a:solidFill>
-              </a:rPr>
+              <a:rPr lang="en-US" sz="1000" dirty="0"/>
               <a:t>, model)</a:t>
             </a:r>
-            <a:endParaRPr lang="en-US" sz="1000" dirty="0"/>
           </a:p>
         </p:txBody>
       </p:sp>
@@ -6146,7 +5971,7 @@
           </a:prstGeom>
           <a:ln>
             <a:solidFill>
-              <a:srgbClr val="7030A0"/>
+              <a:srgbClr val="0070C0"/>
             </a:solidFill>
             <a:tailEnd type="triangle"/>
           </a:ln>
@@ -6230,8 +6055,8 @@
         </p:nvSpPr>
         <p:spPr>
           <a:xfrm>
-            <a:off x="7352376" y="4062302"/>
-            <a:ext cx="1231620" cy="307777"/>
+            <a:off x="7285585" y="3985205"/>
+            <a:ext cx="1136290" cy="276999"/>
           </a:xfrm>
           <a:prstGeom prst="rect">
             <a:avLst/>
@@ -6257,26 +6082,13 @@
           <a:p>
             <a:pPr algn="ctr"/>
             <a:r>
-              <a:rPr lang="en-US" sz="1000" dirty="0" err="1">
-                <a:solidFill>
-                  <a:schemeClr val="accent4">
-                    <a:lumMod val="75000"/>
-                  </a:schemeClr>
-                </a:solidFill>
-              </a:rPr>
+              <a:rPr lang="en-US" sz="900" dirty="0" err="1"/>
               <a:t>addMedicineForUpdate</a:t>
             </a:r>
             <a:r>
-              <a:rPr lang="en-US" sz="1000" dirty="0">
-                <a:solidFill>
-                  <a:schemeClr val="accent4">
-                    <a:lumMod val="75000"/>
-                  </a:schemeClr>
-                </a:solidFill>
-              </a:rPr>
+              <a:rPr lang="en-US" sz="900" dirty="0"/>
               <a:t>(patient, med)</a:t>
             </a:r>
-            <a:endParaRPr lang="en-US" sz="1000" dirty="0"/>
           </a:p>
         </p:txBody>
       </p:sp>
@@ -6321,13 +6133,7 @@
           <a:p>
             <a:pPr algn="ctr"/>
             <a:r>
-              <a:rPr lang="en-US" sz="1000" dirty="0" err="1">
-                <a:solidFill>
-                  <a:schemeClr val="accent4">
-                    <a:lumMod val="75000"/>
-                  </a:schemeClr>
-                </a:solidFill>
-              </a:rPr>
+              <a:rPr lang="en-US" sz="1000" dirty="0" err="1"/>
               <a:t>updatedPatient</a:t>
             </a:r>
             <a:endParaRPr lang="en-US" sz="1000" dirty="0"/>
@@ -6465,6 +6271,316 @@
           </a:p>
         </p:txBody>
       </p:sp>
+      <p:sp>
+        <p:nvSpPr>
+          <p:cNvPr id="75" name="Rectangle 62">
+            <a:extLst>
+              <a:ext uri="{FF2B5EF4-FFF2-40B4-BE49-F238E27FC236}">
+                <a16:creationId xmlns:a16="http://schemas.microsoft.com/office/drawing/2014/main" id="{EEA6CC37-1417-480E-A232-757D68F83E91}"/>
+              </a:ext>
+            </a:extLst>
+          </p:cNvPr>
+          <p:cNvSpPr/>
+          <p:nvPr/>
+        </p:nvSpPr>
+        <p:spPr>
+          <a:xfrm>
+            <a:off x="7879689" y="1293145"/>
+            <a:ext cx="1127409" cy="782135"/>
+          </a:xfrm>
+          <a:prstGeom prst="rect">
+            <a:avLst/>
+          </a:prstGeom>
+          <a:solidFill>
+            <a:srgbClr val="0070C0"/>
+          </a:solidFill>
+          <a:ln w="19050">
+            <a:solidFill>
+              <a:srgbClr val="0070C0"/>
+            </a:solidFill>
+          </a:ln>
+          <a:effectLst/>
+        </p:spPr>
+        <p:style>
+          <a:lnRef idx="1">
+            <a:schemeClr val="accent2"/>
+          </a:lnRef>
+          <a:fillRef idx="2">
+            <a:schemeClr val="accent2"/>
+          </a:fillRef>
+          <a:effectRef idx="1">
+            <a:schemeClr val="accent2"/>
+          </a:effectRef>
+          <a:fontRef idx="minor">
+            <a:schemeClr val="dk1"/>
+          </a:fontRef>
+        </p:style>
+        <p:txBody>
+          <a:bodyPr rtlCol="0" anchor="ctr"/>
+          <a:lstStyle/>
+          <a:p>
+            <a:pPr algn="ctr"/>
+            <a:r>
+              <a:rPr lang="en-US" sz="1600" dirty="0">
+                <a:solidFill>
+                  <a:schemeClr val="bg1"/>
+                </a:solidFill>
+              </a:rPr>
+              <a:t>&lt;&lt;class&gt;&gt;</a:t>
+            </a:r>
+          </a:p>
+          <a:p>
+            <a:pPr algn="ctr"/>
+            <a:r>
+              <a:rPr lang="en-US" sz="1600" dirty="0" err="1">
+                <a:solidFill>
+                  <a:schemeClr val="bg1"/>
+                </a:solidFill>
+              </a:rPr>
+              <a:t>CommandUtil</a:t>
+            </a:r>
+            <a:endParaRPr lang="en-SG" sz="1600" dirty="0">
+              <a:solidFill>
+                <a:schemeClr val="bg1"/>
+              </a:solidFill>
+            </a:endParaRPr>
+          </a:p>
+        </p:txBody>
+      </p:sp>
+      <p:cxnSp>
+        <p:nvCxnSpPr>
+          <p:cNvPr id="76" name="Straight Connector 75">
+            <a:extLst>
+              <a:ext uri="{FF2B5EF4-FFF2-40B4-BE49-F238E27FC236}">
+                <a16:creationId xmlns:a16="http://schemas.microsoft.com/office/drawing/2014/main" id="{EC2C262C-5689-4988-99B5-08373A951BBC}"/>
+              </a:ext>
+            </a:extLst>
+          </p:cNvPr>
+          <p:cNvCxnSpPr>
+            <a:cxnSpLocks/>
+          </p:cNvCxnSpPr>
+          <p:nvPr/>
+        </p:nvCxnSpPr>
+        <p:spPr>
+          <a:xfrm>
+            <a:off x="8465327" y="2048041"/>
+            <a:ext cx="0" cy="3705446"/>
+          </a:xfrm>
+          <a:prstGeom prst="line">
+            <a:avLst/>
+          </a:prstGeom>
+          <a:ln w="19050">
+            <a:solidFill>
+              <a:srgbClr val="0070C0"/>
+            </a:solidFill>
+            <a:prstDash val="sysDash"/>
+          </a:ln>
+          <a:effectLst/>
+        </p:spPr>
+        <p:style>
+          <a:lnRef idx="1">
+            <a:schemeClr val="accent1"/>
+          </a:lnRef>
+          <a:fillRef idx="2">
+            <a:schemeClr val="accent1"/>
+          </a:fillRef>
+          <a:effectRef idx="1">
+            <a:schemeClr val="accent1"/>
+          </a:effectRef>
+          <a:fontRef idx="minor">
+            <a:schemeClr val="dk1"/>
+          </a:fontRef>
+        </p:style>
+      </p:cxnSp>
+      <p:cxnSp>
+        <p:nvCxnSpPr>
+          <p:cNvPr id="77" name="Straight Arrow Connector 76">
+            <a:extLst>
+              <a:ext uri="{FF2B5EF4-FFF2-40B4-BE49-F238E27FC236}">
+                <a16:creationId xmlns:a16="http://schemas.microsoft.com/office/drawing/2014/main" id="{682DC225-3011-4885-B404-9F0637BEF62A}"/>
+              </a:ext>
+            </a:extLst>
+          </p:cNvPr>
+          <p:cNvCxnSpPr>
+            <a:cxnSpLocks/>
+          </p:cNvCxnSpPr>
+          <p:nvPr/>
+        </p:nvCxnSpPr>
+        <p:spPr>
+          <a:xfrm flipV="1">
+            <a:off x="7221847" y="3406160"/>
+            <a:ext cx="1152062" cy="19947"/>
+          </a:xfrm>
+          <a:prstGeom prst="straightConnector1">
+            <a:avLst/>
+          </a:prstGeom>
+          <a:ln w="19050">
+            <a:solidFill>
+              <a:srgbClr val="0070C0"/>
+            </a:solidFill>
+            <a:tailEnd type="arrow"/>
+          </a:ln>
+        </p:spPr>
+        <p:style>
+          <a:lnRef idx="1">
+            <a:schemeClr val="accent1"/>
+          </a:lnRef>
+          <a:fillRef idx="0">
+            <a:schemeClr val="accent1"/>
+          </a:fillRef>
+          <a:effectRef idx="0">
+            <a:schemeClr val="accent1"/>
+          </a:effectRef>
+          <a:fontRef idx="minor">
+            <a:schemeClr val="tx1"/>
+          </a:fontRef>
+        </p:style>
+      </p:cxnSp>
+      <p:sp>
+        <p:nvSpPr>
+          <p:cNvPr id="79" name="Rectangle 78">
+            <a:extLst>
+              <a:ext uri="{FF2B5EF4-FFF2-40B4-BE49-F238E27FC236}">
+                <a16:creationId xmlns:a16="http://schemas.microsoft.com/office/drawing/2014/main" id="{09444FB0-09D2-432E-9E51-5E0C0F872507}"/>
+              </a:ext>
+            </a:extLst>
+          </p:cNvPr>
+          <p:cNvSpPr/>
+          <p:nvPr/>
+        </p:nvSpPr>
+        <p:spPr>
+          <a:xfrm>
+            <a:off x="8364152" y="3407647"/>
+            <a:ext cx="154578" cy="302293"/>
+          </a:xfrm>
+          <a:prstGeom prst="rect">
+            <a:avLst/>
+          </a:prstGeom>
+          <a:solidFill>
+            <a:srgbClr val="0070C0"/>
+          </a:solidFill>
+          <a:ln>
+            <a:solidFill>
+              <a:srgbClr val="0070C0"/>
+            </a:solidFill>
+          </a:ln>
+          <a:effectLst/>
+        </p:spPr>
+        <p:style>
+          <a:lnRef idx="1">
+            <a:schemeClr val="accent3"/>
+          </a:lnRef>
+          <a:fillRef idx="2">
+            <a:schemeClr val="accent3"/>
+          </a:fillRef>
+          <a:effectRef idx="1">
+            <a:schemeClr val="accent3"/>
+          </a:effectRef>
+          <a:fontRef idx="minor">
+            <a:schemeClr val="dk1"/>
+          </a:fontRef>
+        </p:style>
+        <p:txBody>
+          <a:bodyPr rtlCol="0" anchor="ctr"/>
+          <a:lstStyle/>
+          <a:p>
+            <a:pPr algn="ctr"/>
+            <a:endParaRPr lang="en-SG" sz="1400"/>
+          </a:p>
+        </p:txBody>
+      </p:sp>
+      <p:cxnSp>
+        <p:nvCxnSpPr>
+          <p:cNvPr id="85" name="Straight Arrow Connector 84">
+            <a:extLst>
+              <a:ext uri="{FF2B5EF4-FFF2-40B4-BE49-F238E27FC236}">
+                <a16:creationId xmlns:a16="http://schemas.microsoft.com/office/drawing/2014/main" id="{21ED7CDC-0080-456F-9A0C-58321D8F0F66}"/>
+              </a:ext>
+            </a:extLst>
+          </p:cNvPr>
+          <p:cNvCxnSpPr>
+            <a:cxnSpLocks/>
+          </p:cNvCxnSpPr>
+          <p:nvPr/>
+        </p:nvCxnSpPr>
+        <p:spPr>
+          <a:xfrm flipV="1">
+            <a:off x="7207554" y="3704115"/>
+            <a:ext cx="1166355" cy="20605"/>
+          </a:xfrm>
+          <a:prstGeom prst="straightConnector1">
+            <a:avLst/>
+          </a:prstGeom>
+          <a:ln w="19050">
+            <a:solidFill>
+              <a:srgbClr val="0070C0"/>
+            </a:solidFill>
+            <a:prstDash val="sysDash"/>
+            <a:headEnd type="arrow" w="med" len="med"/>
+            <a:tailEnd type="none" w="med" len="med"/>
+          </a:ln>
+        </p:spPr>
+        <p:style>
+          <a:lnRef idx="1">
+            <a:schemeClr val="accent1"/>
+          </a:lnRef>
+          <a:fillRef idx="0">
+            <a:schemeClr val="accent1"/>
+          </a:fillRef>
+          <a:effectRef idx="0">
+            <a:schemeClr val="accent1"/>
+          </a:effectRef>
+          <a:fontRef idx="minor">
+            <a:schemeClr val="tx1"/>
+          </a:fontRef>
+        </p:style>
+      </p:cxnSp>
+      <p:cxnSp>
+        <p:nvCxnSpPr>
+          <p:cNvPr id="87" name="Straight Arrow Connector 86">
+            <a:extLst>
+              <a:ext uri="{FF2B5EF4-FFF2-40B4-BE49-F238E27FC236}">
+                <a16:creationId xmlns:a16="http://schemas.microsoft.com/office/drawing/2014/main" id="{B0921A5A-C978-4CC9-860E-1CA1F623655B}"/>
+              </a:ext>
+            </a:extLst>
+          </p:cNvPr>
+          <p:cNvCxnSpPr>
+            <a:cxnSpLocks/>
+          </p:cNvCxnSpPr>
+          <p:nvPr/>
+        </p:nvCxnSpPr>
+        <p:spPr>
+          <a:xfrm flipV="1">
+            <a:off x="7189947" y="4701652"/>
+            <a:ext cx="126359" cy="1"/>
+          </a:xfrm>
+          <a:prstGeom prst="straightConnector1">
+            <a:avLst/>
+          </a:prstGeom>
+          <a:ln w="19050">
+            <a:solidFill>
+              <a:srgbClr val="0070C0"/>
+            </a:solidFill>
+            <a:prstDash val="sysDash"/>
+            <a:headEnd type="arrow" w="med" len="med"/>
+            <a:tailEnd type="none" w="med" len="med"/>
+          </a:ln>
+        </p:spPr>
+        <p:style>
+          <a:lnRef idx="1">
+            <a:schemeClr val="accent1"/>
+          </a:lnRef>
+          <a:fillRef idx="0">
+            <a:schemeClr val="accent1"/>
+          </a:fillRef>
+          <a:effectRef idx="0">
+            <a:schemeClr val="accent1"/>
+          </a:effectRef>
+          <a:fontRef idx="minor">
+            <a:schemeClr val="tx1"/>
+          </a:fontRef>
+        </p:style>
+      </p:cxnSp>
     </p:spTree>
     <p:extLst>
       <p:ext uri="{BB962C8B-B14F-4D97-AF65-F5344CB8AC3E}">

</xml_diff>

<commit_message>
Add missing <<static>> tag in method call of addmeds sequence diagram in Developer Guide
</commit_message>
<xml_diff>
--- a/docs/diagrams/AddmedsSequenceDiagram.pptx
+++ b/docs/diagrams/AddmedsSequenceDiagram.pptx
@@ -5846,8 +5846,8 @@
         </p:nvSpPr>
         <p:spPr>
           <a:xfrm>
-            <a:off x="7116494" y="3035273"/>
-            <a:ext cx="1365410" cy="307777"/>
+            <a:off x="7146472" y="2926468"/>
+            <a:ext cx="1365410" cy="461665"/>
           </a:xfrm>
           <a:prstGeom prst="rect">
             <a:avLst/>
@@ -5870,6 +5870,13 @@
               </a:defRPr>
             </a:lvl1pPr>
           </a:lstStyle>
+          <a:p>
+            <a:pPr algn="ctr"/>
+            <a:r>
+              <a:rPr lang="en-US" sz="1000" dirty="0"/>
+              <a:t>&lt;&lt;static&gt;&gt;</a:t>
+            </a:r>
+          </a:p>
           <a:p>
             <a:pPr algn="ctr"/>
             <a:r>

</xml_diff>

<commit_message>
Update sequence diagram to include CommandUtil#getPatient interactions with model.
</commit_message>
<xml_diff>
--- a/docs/diagrams/AddmedsSequenceDiagram.pptx
+++ b/docs/diagrams/AddmedsSequenceDiagram.pptx
@@ -4670,7 +4670,7 @@
         </p:nvSpPr>
         <p:spPr>
           <a:xfrm>
-            <a:off x="9419555" y="2971266"/>
+            <a:off x="9381100" y="968800"/>
             <a:ext cx="841636" cy="300180"/>
           </a:xfrm>
           <a:prstGeom prst="rect">
@@ -4726,13 +4726,14 @@
           <p:cNvPr id="46" name="Straight Connector 45"/>
           <p:cNvCxnSpPr>
             <a:cxnSpLocks/>
+            <a:stCxn id="40" idx="2"/>
           </p:cNvCxnSpPr>
           <p:nvPr/>
         </p:nvCxnSpPr>
         <p:spPr>
-          <a:xfrm flipH="1">
-            <a:off x="9804807" y="3253853"/>
-            <a:ext cx="8756" cy="2594920"/>
+          <a:xfrm>
+            <a:off x="9801918" y="1268980"/>
+            <a:ext cx="2889" cy="4579793"/>
           </a:xfrm>
           <a:prstGeom prst="line">
             <a:avLst/>
@@ -5480,7 +5481,7 @@
         </p:nvSpPr>
         <p:spPr>
           <a:xfrm>
-            <a:off x="7284221" y="3515929"/>
+            <a:off x="7264237" y="3830947"/>
             <a:ext cx="1126374" cy="153888"/>
           </a:xfrm>
           <a:prstGeom prst="rect">
@@ -6062,7 +6063,7 @@
         </p:nvSpPr>
         <p:spPr>
           <a:xfrm>
-            <a:off x="7285585" y="3985205"/>
+            <a:off x="7285816" y="4066579"/>
             <a:ext cx="1136290" cy="276999"/>
           </a:xfrm>
           <a:prstGeom prst="rect">
@@ -6458,7 +6459,7 @@
         <p:spPr>
           <a:xfrm>
             <a:off x="8364152" y="3407647"/>
-            <a:ext cx="154578" cy="302293"/>
+            <a:ext cx="175296" cy="615173"/>
           </a:xfrm>
           <a:prstGeom prst="rect">
             <a:avLst/>
@@ -6512,7 +6513,7 @@
         </p:nvCxnSpPr>
         <p:spPr>
           <a:xfrm flipV="1">
-            <a:off x="7207554" y="3704115"/>
+            <a:off x="7228550" y="4015275"/>
             <a:ext cx="1166355" cy="20605"/>
           </a:xfrm>
           <a:prstGeom prst="straightConnector1">
@@ -6588,6 +6589,528 @@
           </a:fontRef>
         </p:style>
       </p:cxnSp>
+      <p:sp>
+        <p:nvSpPr>
+          <p:cNvPr id="78" name="Rectangle 77">
+            <a:extLst>
+              <a:ext uri="{FF2B5EF4-FFF2-40B4-BE49-F238E27FC236}">
+                <a16:creationId xmlns:a16="http://schemas.microsoft.com/office/drawing/2014/main" id="{A8505981-E883-44DC-88AF-63833F33D220}"/>
+              </a:ext>
+            </a:extLst>
+          </p:cNvPr>
+          <p:cNvSpPr/>
+          <p:nvPr/>
+        </p:nvSpPr>
+        <p:spPr>
+          <a:xfrm>
+            <a:off x="9732176" y="3469008"/>
+            <a:ext cx="132893" cy="184662"/>
+          </a:xfrm>
+          <a:prstGeom prst="rect">
+            <a:avLst/>
+          </a:prstGeom>
+          <a:solidFill>
+            <a:srgbClr val="7030A0"/>
+          </a:solidFill>
+          <a:ln>
+            <a:solidFill>
+              <a:srgbClr val="7030A0"/>
+            </a:solidFill>
+          </a:ln>
+          <a:effectLst/>
+        </p:spPr>
+        <p:style>
+          <a:lnRef idx="1">
+            <a:schemeClr val="accent3"/>
+          </a:lnRef>
+          <a:fillRef idx="2">
+            <a:schemeClr val="accent3"/>
+          </a:fillRef>
+          <a:effectRef idx="1">
+            <a:schemeClr val="accent3"/>
+          </a:effectRef>
+          <a:fontRef idx="minor">
+            <a:schemeClr val="dk1"/>
+          </a:fontRef>
+        </p:style>
+        <p:txBody>
+          <a:bodyPr rtlCol="0" anchor="ctr"/>
+          <a:lstStyle/>
+          <a:p>
+            <a:pPr algn="ctr"/>
+            <a:endParaRPr lang="en-SG" sz="1400"/>
+          </a:p>
+        </p:txBody>
+      </p:sp>
+      <p:cxnSp>
+        <p:nvCxnSpPr>
+          <p:cNvPr id="88" name="Straight Arrow Connector 87">
+            <a:extLst>
+              <a:ext uri="{FF2B5EF4-FFF2-40B4-BE49-F238E27FC236}">
+                <a16:creationId xmlns:a16="http://schemas.microsoft.com/office/drawing/2014/main" id="{AEAD58B2-985A-4D96-BCFE-3DFF932FD81F}"/>
+              </a:ext>
+            </a:extLst>
+          </p:cNvPr>
+          <p:cNvCxnSpPr>
+            <a:cxnSpLocks/>
+          </p:cNvCxnSpPr>
+          <p:nvPr/>
+        </p:nvCxnSpPr>
+        <p:spPr>
+          <a:xfrm flipV="1">
+            <a:off x="8508620" y="3470355"/>
+            <a:ext cx="1222105" cy="8954"/>
+          </a:xfrm>
+          <a:prstGeom prst="straightConnector1">
+            <a:avLst/>
+          </a:prstGeom>
+          <a:ln w="19050">
+            <a:solidFill>
+              <a:srgbClr val="0070C0"/>
+            </a:solidFill>
+            <a:tailEnd type="arrow"/>
+          </a:ln>
+        </p:spPr>
+        <p:style>
+          <a:lnRef idx="1">
+            <a:schemeClr val="accent1"/>
+          </a:lnRef>
+          <a:fillRef idx="0">
+            <a:schemeClr val="accent1"/>
+          </a:fillRef>
+          <a:effectRef idx="0">
+            <a:schemeClr val="accent1"/>
+          </a:effectRef>
+          <a:fontRef idx="minor">
+            <a:schemeClr val="tx1"/>
+          </a:fontRef>
+        </p:style>
+      </p:cxnSp>
+      <p:cxnSp>
+        <p:nvCxnSpPr>
+          <p:cNvPr id="90" name="Straight Arrow Connector 89">
+            <a:extLst>
+              <a:ext uri="{FF2B5EF4-FFF2-40B4-BE49-F238E27FC236}">
+                <a16:creationId xmlns:a16="http://schemas.microsoft.com/office/drawing/2014/main" id="{C0EA5FBA-4D22-4BE8-AC9F-DF3D3DF95518}"/>
+              </a:ext>
+            </a:extLst>
+          </p:cNvPr>
+          <p:cNvCxnSpPr>
+            <a:cxnSpLocks/>
+          </p:cNvCxnSpPr>
+          <p:nvPr/>
+        </p:nvCxnSpPr>
+        <p:spPr>
+          <a:xfrm>
+            <a:off x="8539448" y="3653670"/>
+            <a:ext cx="1169231" cy="0"/>
+          </a:xfrm>
+          <a:prstGeom prst="straightConnector1">
+            <a:avLst/>
+          </a:prstGeom>
+          <a:ln w="19050">
+            <a:solidFill>
+              <a:srgbClr val="7030A0"/>
+            </a:solidFill>
+            <a:prstDash val="sysDash"/>
+            <a:headEnd type="arrow" w="med" len="med"/>
+            <a:tailEnd type="none" w="med" len="med"/>
+          </a:ln>
+        </p:spPr>
+        <p:style>
+          <a:lnRef idx="1">
+            <a:schemeClr val="accent1"/>
+          </a:lnRef>
+          <a:fillRef idx="0">
+            <a:schemeClr val="accent1"/>
+          </a:fillRef>
+          <a:effectRef idx="0">
+            <a:schemeClr val="accent1"/>
+          </a:effectRef>
+          <a:fontRef idx="minor">
+            <a:schemeClr val="tx1"/>
+          </a:fontRef>
+        </p:style>
+      </p:cxnSp>
+      <p:sp>
+        <p:nvSpPr>
+          <p:cNvPr id="91" name="TextBox 90">
+            <a:extLst>
+              <a:ext uri="{FF2B5EF4-FFF2-40B4-BE49-F238E27FC236}">
+                <a16:creationId xmlns:a16="http://schemas.microsoft.com/office/drawing/2014/main" id="{5F9F510F-416D-4D57-844E-5D1DD17A4F6F}"/>
+              </a:ext>
+            </a:extLst>
+          </p:cNvPr>
+          <p:cNvSpPr txBox="1"/>
+          <p:nvPr/>
+        </p:nvSpPr>
+        <p:spPr>
+          <a:xfrm>
+            <a:off x="8688689" y="3157490"/>
+            <a:ext cx="957316" cy="276999"/>
+          </a:xfrm>
+          <a:prstGeom prst="rect">
+            <a:avLst/>
+          </a:prstGeom>
+          <a:noFill/>
+        </p:spPr>
+        <p:txBody>
+          <a:bodyPr wrap="square" lIns="0" tIns="0" rIns="0" bIns="0" rtlCol="0">
+            <a:spAutoFit/>
+          </a:bodyPr>
+          <a:lstStyle>
+            <a:defPPr>
+              <a:defRPr lang="en-US"/>
+            </a:defPPr>
+            <a:lvl1pPr algn="r">
+              <a:defRPr sz="1400">
+                <a:solidFill>
+                  <a:srgbClr val="0070C0"/>
+                </a:solidFill>
+              </a:defRPr>
+            </a:lvl1pPr>
+          </a:lstStyle>
+          <a:p>
+            <a:pPr algn="ctr"/>
+            <a:r>
+              <a:rPr lang="en-US" sz="900" dirty="0" err="1">
+                <a:solidFill>
+                  <a:schemeClr val="accent4">
+                    <a:lumMod val="75000"/>
+                  </a:schemeClr>
+                </a:solidFill>
+              </a:rPr>
+              <a:t>getFilteredCheckedOutPersonList</a:t>
+            </a:r>
+            <a:r>
+              <a:rPr lang="en-US" sz="900" dirty="0">
+                <a:solidFill>
+                  <a:schemeClr val="accent4">
+                    <a:lumMod val="75000"/>
+                  </a:schemeClr>
+                </a:solidFill>
+              </a:rPr>
+              <a:t>()</a:t>
+            </a:r>
+            <a:endParaRPr lang="en-US" sz="900" dirty="0"/>
+          </a:p>
+        </p:txBody>
+      </p:sp>
+      <p:sp>
+        <p:nvSpPr>
+          <p:cNvPr id="97" name="Rectangle 96">
+            <a:extLst>
+              <a:ext uri="{FF2B5EF4-FFF2-40B4-BE49-F238E27FC236}">
+                <a16:creationId xmlns:a16="http://schemas.microsoft.com/office/drawing/2014/main" id="{E4275444-C404-43C8-BDBC-30F06EB42201}"/>
+              </a:ext>
+            </a:extLst>
+          </p:cNvPr>
+          <p:cNvSpPr/>
+          <p:nvPr/>
+        </p:nvSpPr>
+        <p:spPr>
+          <a:xfrm>
+            <a:off x="9729280" y="3757724"/>
+            <a:ext cx="126127" cy="184662"/>
+          </a:xfrm>
+          <a:prstGeom prst="rect">
+            <a:avLst/>
+          </a:prstGeom>
+          <a:solidFill>
+            <a:srgbClr val="7030A0"/>
+          </a:solidFill>
+          <a:ln>
+            <a:solidFill>
+              <a:srgbClr val="7030A0"/>
+            </a:solidFill>
+          </a:ln>
+          <a:effectLst/>
+        </p:spPr>
+        <p:style>
+          <a:lnRef idx="1">
+            <a:schemeClr val="accent3"/>
+          </a:lnRef>
+          <a:fillRef idx="2">
+            <a:schemeClr val="accent3"/>
+          </a:fillRef>
+          <a:effectRef idx="1">
+            <a:schemeClr val="accent3"/>
+          </a:effectRef>
+          <a:fontRef idx="minor">
+            <a:schemeClr val="dk1"/>
+          </a:fontRef>
+        </p:style>
+        <p:txBody>
+          <a:bodyPr rtlCol="0" anchor="ctr"/>
+          <a:lstStyle/>
+          <a:p>
+            <a:pPr algn="ctr"/>
+            <a:endParaRPr lang="en-SG" sz="1400"/>
+          </a:p>
+        </p:txBody>
+      </p:sp>
+      <p:cxnSp>
+        <p:nvCxnSpPr>
+          <p:cNvPr id="98" name="Straight Arrow Connector 97">
+            <a:extLst>
+              <a:ext uri="{FF2B5EF4-FFF2-40B4-BE49-F238E27FC236}">
+                <a16:creationId xmlns:a16="http://schemas.microsoft.com/office/drawing/2014/main" id="{3C37D6EC-C470-4BD8-A385-2C14DC6B2E3D}"/>
+              </a:ext>
+            </a:extLst>
+          </p:cNvPr>
+          <p:cNvCxnSpPr>
+            <a:cxnSpLocks/>
+          </p:cNvCxnSpPr>
+          <p:nvPr/>
+        </p:nvCxnSpPr>
+        <p:spPr>
+          <a:xfrm flipV="1">
+            <a:off x="8520878" y="3795118"/>
+            <a:ext cx="1222105" cy="8954"/>
+          </a:xfrm>
+          <a:prstGeom prst="straightConnector1">
+            <a:avLst/>
+          </a:prstGeom>
+          <a:ln w="19050">
+            <a:solidFill>
+              <a:srgbClr val="0070C0"/>
+            </a:solidFill>
+            <a:tailEnd type="arrow"/>
+          </a:ln>
+        </p:spPr>
+        <p:style>
+          <a:lnRef idx="1">
+            <a:schemeClr val="accent1"/>
+          </a:lnRef>
+          <a:fillRef idx="0">
+            <a:schemeClr val="accent1"/>
+          </a:fillRef>
+          <a:effectRef idx="0">
+            <a:schemeClr val="accent1"/>
+          </a:effectRef>
+          <a:fontRef idx="minor">
+            <a:schemeClr val="tx1"/>
+          </a:fontRef>
+        </p:style>
+      </p:cxnSp>
+      <p:cxnSp>
+        <p:nvCxnSpPr>
+          <p:cNvPr id="99" name="Straight Arrow Connector 98">
+            <a:extLst>
+              <a:ext uri="{FF2B5EF4-FFF2-40B4-BE49-F238E27FC236}">
+                <a16:creationId xmlns:a16="http://schemas.microsoft.com/office/drawing/2014/main" id="{8F60EB07-0A86-4C9E-9701-AC42EB5FD234}"/>
+              </a:ext>
+            </a:extLst>
+          </p:cNvPr>
+          <p:cNvCxnSpPr>
+            <a:cxnSpLocks/>
+          </p:cNvCxnSpPr>
+          <p:nvPr/>
+        </p:nvCxnSpPr>
+        <p:spPr>
+          <a:xfrm>
+            <a:off x="8539448" y="3943183"/>
+            <a:ext cx="1169231" cy="0"/>
+          </a:xfrm>
+          <a:prstGeom prst="straightConnector1">
+            <a:avLst/>
+          </a:prstGeom>
+          <a:ln w="19050">
+            <a:solidFill>
+              <a:srgbClr val="7030A0"/>
+            </a:solidFill>
+            <a:prstDash val="sysDash"/>
+            <a:headEnd type="arrow" w="med" len="med"/>
+            <a:tailEnd type="none" w="med" len="med"/>
+          </a:ln>
+        </p:spPr>
+        <p:style>
+          <a:lnRef idx="1">
+            <a:schemeClr val="accent1"/>
+          </a:lnRef>
+          <a:fillRef idx="0">
+            <a:schemeClr val="accent1"/>
+          </a:fillRef>
+          <a:effectRef idx="0">
+            <a:schemeClr val="accent1"/>
+          </a:effectRef>
+          <a:fontRef idx="minor">
+            <a:schemeClr val="tx1"/>
+          </a:fontRef>
+        </p:style>
+      </p:cxnSp>
+      <p:sp>
+        <p:nvSpPr>
+          <p:cNvPr id="105" name="TextBox 104">
+            <a:extLst>
+              <a:ext uri="{FF2B5EF4-FFF2-40B4-BE49-F238E27FC236}">
+                <a16:creationId xmlns:a16="http://schemas.microsoft.com/office/drawing/2014/main" id="{6E29B1A5-2D05-4B16-B04D-D1762276D56B}"/>
+              </a:ext>
+            </a:extLst>
+          </p:cNvPr>
+          <p:cNvSpPr txBox="1"/>
+          <p:nvPr/>
+        </p:nvSpPr>
+        <p:spPr>
+          <a:xfrm>
+            <a:off x="8551185" y="3526301"/>
+            <a:ext cx="1221266" cy="107722"/>
+          </a:xfrm>
+          <a:prstGeom prst="rect">
+            <a:avLst/>
+          </a:prstGeom>
+          <a:noFill/>
+        </p:spPr>
+        <p:txBody>
+          <a:bodyPr wrap="square" lIns="0" tIns="0" rIns="0" bIns="0" rtlCol="0">
+            <a:spAutoFit/>
+          </a:bodyPr>
+          <a:lstStyle>
+            <a:defPPr>
+              <a:defRPr lang="en-US"/>
+            </a:defPPr>
+            <a:lvl1pPr algn="r">
+              <a:defRPr sz="1400">
+                <a:solidFill>
+                  <a:srgbClr val="0070C0"/>
+                </a:solidFill>
+              </a:defRPr>
+            </a:lvl1pPr>
+          </a:lstStyle>
+          <a:p>
+            <a:pPr algn="ctr"/>
+            <a:r>
+              <a:rPr lang="en-US" sz="700" dirty="0" err="1">
+                <a:solidFill>
+                  <a:schemeClr val="accent4">
+                    <a:lumMod val="75000"/>
+                  </a:schemeClr>
+                </a:solidFill>
+              </a:rPr>
+              <a:t>matchedCheckedOutPatients</a:t>
+            </a:r>
+            <a:endParaRPr lang="en-US" sz="700" dirty="0"/>
+          </a:p>
+        </p:txBody>
+      </p:sp>
+      <p:sp>
+        <p:nvSpPr>
+          <p:cNvPr id="106" name="TextBox 105">
+            <a:extLst>
+              <a:ext uri="{FF2B5EF4-FFF2-40B4-BE49-F238E27FC236}">
+                <a16:creationId xmlns:a16="http://schemas.microsoft.com/office/drawing/2014/main" id="{6139EB11-3606-4B90-A148-C121EF6E98FB}"/>
+              </a:ext>
+            </a:extLst>
+          </p:cNvPr>
+          <p:cNvSpPr txBox="1"/>
+          <p:nvPr/>
+        </p:nvSpPr>
+        <p:spPr>
+          <a:xfrm>
+            <a:off x="8538130" y="3963790"/>
+            <a:ext cx="1221266" cy="107722"/>
+          </a:xfrm>
+          <a:prstGeom prst="rect">
+            <a:avLst/>
+          </a:prstGeom>
+          <a:noFill/>
+        </p:spPr>
+        <p:txBody>
+          <a:bodyPr wrap="square" lIns="0" tIns="0" rIns="0" bIns="0" rtlCol="0">
+            <a:spAutoFit/>
+          </a:bodyPr>
+          <a:lstStyle>
+            <a:defPPr>
+              <a:defRPr lang="en-US"/>
+            </a:defPPr>
+            <a:lvl1pPr algn="r">
+              <a:defRPr sz="1400">
+                <a:solidFill>
+                  <a:srgbClr val="0070C0"/>
+                </a:solidFill>
+              </a:defRPr>
+            </a:lvl1pPr>
+          </a:lstStyle>
+          <a:p>
+            <a:pPr algn="ctr"/>
+            <a:r>
+              <a:rPr lang="en-US" sz="700" dirty="0" err="1">
+                <a:solidFill>
+                  <a:schemeClr val="accent4">
+                    <a:lumMod val="75000"/>
+                  </a:schemeClr>
+                </a:solidFill>
+              </a:rPr>
+              <a:t>matchedCheckedInPatients</a:t>
+            </a:r>
+            <a:endParaRPr lang="en-US" sz="700" dirty="0"/>
+          </a:p>
+        </p:txBody>
+      </p:sp>
+      <p:sp>
+        <p:nvSpPr>
+          <p:cNvPr id="107" name="TextBox 106">
+            <a:extLst>
+              <a:ext uri="{FF2B5EF4-FFF2-40B4-BE49-F238E27FC236}">
+                <a16:creationId xmlns:a16="http://schemas.microsoft.com/office/drawing/2014/main" id="{4AB2685A-28E7-4BE6-BD27-C0592513C372}"/>
+              </a:ext>
+            </a:extLst>
+          </p:cNvPr>
+          <p:cNvSpPr txBox="1"/>
+          <p:nvPr/>
+        </p:nvSpPr>
+        <p:spPr>
+          <a:xfrm>
+            <a:off x="8649643" y="3670357"/>
+            <a:ext cx="957316" cy="123111"/>
+          </a:xfrm>
+          <a:prstGeom prst="rect">
+            <a:avLst/>
+          </a:prstGeom>
+          <a:noFill/>
+        </p:spPr>
+        <p:txBody>
+          <a:bodyPr wrap="square" lIns="0" tIns="0" rIns="0" bIns="0" rtlCol="0">
+            <a:spAutoFit/>
+          </a:bodyPr>
+          <a:lstStyle>
+            <a:defPPr>
+              <a:defRPr lang="en-US"/>
+            </a:defPPr>
+            <a:lvl1pPr algn="r">
+              <a:defRPr sz="1400">
+                <a:solidFill>
+                  <a:srgbClr val="0070C0"/>
+                </a:solidFill>
+              </a:defRPr>
+            </a:lvl1pPr>
+          </a:lstStyle>
+          <a:p>
+            <a:pPr algn="ctr"/>
+            <a:r>
+              <a:rPr lang="en-US" sz="800" dirty="0" err="1">
+                <a:solidFill>
+                  <a:schemeClr val="accent4">
+                    <a:lumMod val="75000"/>
+                  </a:schemeClr>
+                </a:solidFill>
+              </a:rPr>
+              <a:t>getFilteredPersonList</a:t>
+            </a:r>
+            <a:r>
+              <a:rPr lang="en-US" sz="800" dirty="0">
+                <a:solidFill>
+                  <a:schemeClr val="accent4">
+                    <a:lumMod val="75000"/>
+                  </a:schemeClr>
+                </a:solidFill>
+              </a:rPr>
+              <a:t>()</a:t>
+            </a:r>
+            <a:endParaRPr lang="en-US" sz="800" dirty="0"/>
+          </a:p>
+        </p:txBody>
+      </p:sp>
     </p:spTree>
     <p:extLst>
       <p:ext uri="{BB962C8B-B14F-4D97-AF65-F5344CB8AC3E}">

</xml_diff>

<commit_message>
Update `addmeds` sequence diagram (#228)
* Update sequence diagram to replace references to "AddressBook" with "HealthBase"

* Add code contributions
</commit_message>
<xml_diff>
--- a/docs/diagrams/AddmedsSequenceDiagram.pptx
+++ b/docs/diagrams/AddmedsSequenceDiagram.pptx
@@ -3850,18 +3850,15 @@
                   <a:schemeClr val="bg1"/>
                 </a:solidFill>
               </a:rPr>
-              <a:t>:Address</a:t>
-            </a:r>
-          </a:p>
-          <a:p>
-            <a:pPr algn="ctr"/>
+              <a:t>:</a:t>
+            </a:r>
             <a:r>
               <a:rPr lang="en-US" sz="1600" dirty="0" err="1">
                 <a:solidFill>
                   <a:schemeClr val="bg1"/>
                 </a:solidFill>
               </a:rPr>
-              <a:t>BookParser</a:t>
+              <a:t>HealthBaseParser</a:t>
             </a:r>
             <a:endParaRPr lang="en-SG" sz="1600" dirty="0">
               <a:solidFill>
@@ -4565,7 +4562,7 @@
                   <a:schemeClr val="bg1"/>
                 </a:solidFill>
               </a:rPr>
-              <a:t>AddressBook</a:t>
+              <a:t>HealthBase</a:t>
             </a:r>
             <a:endParaRPr lang="en-SG" sz="1600" dirty="0">
               <a:solidFill>

</xml_diff>